<commit_message>
Add screenshot to powerpoint
</commit_message>
<xml_diff>
--- a/LAMDAQuest.pptx
+++ b/LAMDAQuest.pptx
@@ -12,6 +12,7 @@
     <p:sldId id="258" r:id="rId6"/>
     <p:sldId id="261" r:id="rId7"/>
     <p:sldId id="262" r:id="rId8"/>
+    <p:sldId id="263" r:id="rId9"/>
   </p:sldIdLst>
   <p:sldSz cx="12192000" cy="6858000"/>
   <p:notesSz cx="6858000" cy="9144000"/>
@@ -110,6 +111,11 @@
       </a:defRPr>
     </a:lvl9pPr>
   </p:defaultTextStyle>
+  <p:extLst>
+    <p:ext uri="{EFAFB233-063F-42B5-8137-9DF3F51BA10A}">
+      <p15:sldGuideLst xmlns:p15="http://schemas.microsoft.com/office/powerpoint/2012/main"/>
+    </p:ext>
+  </p:extLst>
 </p:presentation>
 </file>
 
@@ -1896,6 +1902,13 @@
         </dgm:presLayoutVars>
       </dgm:prSet>
       <dgm:spPr/>
+      <dgm:t>
+        <a:bodyPr/>
+        <a:lstStyle/>
+        <a:p>
+          <a:endParaRPr lang="en-US"/>
+        </a:p>
+      </dgm:t>
     </dgm:pt>
     <dgm:pt modelId="{DB3ACE68-30A5-45C1-961D-E3F3C4799A6B}" type="pres">
       <dgm:prSet presAssocID="{A28353D4-B001-46BD-904E-0C62B00445AF}" presName="node" presStyleLbl="node1" presStyleIdx="0" presStyleCnt="7">
@@ -1915,10 +1928,24 @@
     <dgm:pt modelId="{34904262-DE28-4F6A-90BE-EC27080626F5}" type="pres">
       <dgm:prSet presAssocID="{AB27E439-E0A0-4839-928F-E6E1DC1FA4C5}" presName="sibTrans" presStyleLbl="sibTrans2D1" presStyleIdx="0" presStyleCnt="7"/>
       <dgm:spPr/>
+      <dgm:t>
+        <a:bodyPr/>
+        <a:lstStyle/>
+        <a:p>
+          <a:endParaRPr lang="en-US"/>
+        </a:p>
+      </dgm:t>
     </dgm:pt>
     <dgm:pt modelId="{3C722D39-67A3-4FA1-B222-69F19D5B31A1}" type="pres">
       <dgm:prSet presAssocID="{AB27E439-E0A0-4839-928F-E6E1DC1FA4C5}" presName="connectorText" presStyleLbl="sibTrans2D1" presStyleIdx="0" presStyleCnt="7"/>
       <dgm:spPr/>
+      <dgm:t>
+        <a:bodyPr/>
+        <a:lstStyle/>
+        <a:p>
+          <a:endParaRPr lang="en-US"/>
+        </a:p>
+      </dgm:t>
     </dgm:pt>
     <dgm:pt modelId="{B4D6990F-A924-4E2B-9DDA-48CFCE5E04B2}" type="pres">
       <dgm:prSet presAssocID="{5D1CD93D-7069-4C5A-90B3-D9705697E474}" presName="node" presStyleLbl="node1" presStyleIdx="1" presStyleCnt="7">
@@ -1938,10 +1965,24 @@
     <dgm:pt modelId="{E68005DA-96BE-42B7-B02B-A45EC6B8D81D}" type="pres">
       <dgm:prSet presAssocID="{AB004D3A-35BC-4320-A572-E5CD5BC61501}" presName="sibTrans" presStyleLbl="sibTrans2D1" presStyleIdx="1" presStyleCnt="7"/>
       <dgm:spPr/>
+      <dgm:t>
+        <a:bodyPr/>
+        <a:lstStyle/>
+        <a:p>
+          <a:endParaRPr lang="en-US"/>
+        </a:p>
+      </dgm:t>
     </dgm:pt>
     <dgm:pt modelId="{64FC099A-F04B-45D7-80B9-1E97A73CFB19}" type="pres">
       <dgm:prSet presAssocID="{AB004D3A-35BC-4320-A572-E5CD5BC61501}" presName="connectorText" presStyleLbl="sibTrans2D1" presStyleIdx="1" presStyleCnt="7"/>
       <dgm:spPr/>
+      <dgm:t>
+        <a:bodyPr/>
+        <a:lstStyle/>
+        <a:p>
+          <a:endParaRPr lang="en-US"/>
+        </a:p>
+      </dgm:t>
     </dgm:pt>
     <dgm:pt modelId="{0371FFE8-DE36-4345-9767-26B8F6643AC9}" type="pres">
       <dgm:prSet presAssocID="{CFE9480C-F23E-45E2-A5EB-FCD2B23B510C}" presName="node" presStyleLbl="node1" presStyleIdx="2" presStyleCnt="7">
@@ -1961,10 +2002,24 @@
     <dgm:pt modelId="{E1428C7B-B3D3-4A0F-8A7F-2E60BB29ECAA}" type="pres">
       <dgm:prSet presAssocID="{91ABEEEB-8443-47F7-9F0A-10CA729DB757}" presName="sibTrans" presStyleLbl="sibTrans2D1" presStyleIdx="2" presStyleCnt="7"/>
       <dgm:spPr/>
+      <dgm:t>
+        <a:bodyPr/>
+        <a:lstStyle/>
+        <a:p>
+          <a:endParaRPr lang="en-US"/>
+        </a:p>
+      </dgm:t>
     </dgm:pt>
     <dgm:pt modelId="{65C0D0FC-562B-4826-A05D-F01B0F35C12C}" type="pres">
       <dgm:prSet presAssocID="{91ABEEEB-8443-47F7-9F0A-10CA729DB757}" presName="connectorText" presStyleLbl="sibTrans2D1" presStyleIdx="2" presStyleCnt="7"/>
       <dgm:spPr/>
+      <dgm:t>
+        <a:bodyPr/>
+        <a:lstStyle/>
+        <a:p>
+          <a:endParaRPr lang="en-US"/>
+        </a:p>
+      </dgm:t>
     </dgm:pt>
     <dgm:pt modelId="{6B9F1F19-FEA9-4092-81A2-34446B9D3EAB}" type="pres">
       <dgm:prSet presAssocID="{5AD5B499-E69F-472F-B52B-C2F367016F96}" presName="node" presStyleLbl="node1" presStyleIdx="3" presStyleCnt="7">
@@ -1973,14 +2028,35 @@
         </dgm:presLayoutVars>
       </dgm:prSet>
       <dgm:spPr/>
+      <dgm:t>
+        <a:bodyPr/>
+        <a:lstStyle/>
+        <a:p>
+          <a:endParaRPr lang="en-US"/>
+        </a:p>
+      </dgm:t>
     </dgm:pt>
     <dgm:pt modelId="{FD10B137-7CB4-44C8-AA49-EA6F5218EB46}" type="pres">
       <dgm:prSet presAssocID="{C8C70DFE-33CD-49BA-B067-70287AFBB572}" presName="sibTrans" presStyleLbl="sibTrans2D1" presStyleIdx="3" presStyleCnt="7"/>
       <dgm:spPr/>
+      <dgm:t>
+        <a:bodyPr/>
+        <a:lstStyle/>
+        <a:p>
+          <a:endParaRPr lang="en-US"/>
+        </a:p>
+      </dgm:t>
     </dgm:pt>
     <dgm:pt modelId="{E3E7670F-C401-4866-8ECC-1A0321E63587}" type="pres">
       <dgm:prSet presAssocID="{C8C70DFE-33CD-49BA-B067-70287AFBB572}" presName="connectorText" presStyleLbl="sibTrans2D1" presStyleIdx="3" presStyleCnt="7"/>
       <dgm:spPr/>
+      <dgm:t>
+        <a:bodyPr/>
+        <a:lstStyle/>
+        <a:p>
+          <a:endParaRPr lang="en-US"/>
+        </a:p>
+      </dgm:t>
     </dgm:pt>
     <dgm:pt modelId="{C239B11C-C6F9-4281-8E22-1ACA24B29BA3}" type="pres">
       <dgm:prSet presAssocID="{3E65ADE5-D689-4A11-9637-3235E28D5085}" presName="node" presStyleLbl="node1" presStyleIdx="4" presStyleCnt="7">
@@ -2000,10 +2076,24 @@
     <dgm:pt modelId="{758C9272-6CE2-4066-AB6D-E1257F71304B}" type="pres">
       <dgm:prSet presAssocID="{7926A391-A58F-45F5-8691-C6199265E60E}" presName="sibTrans" presStyleLbl="sibTrans2D1" presStyleIdx="4" presStyleCnt="7"/>
       <dgm:spPr/>
+      <dgm:t>
+        <a:bodyPr/>
+        <a:lstStyle/>
+        <a:p>
+          <a:endParaRPr lang="en-US"/>
+        </a:p>
+      </dgm:t>
     </dgm:pt>
     <dgm:pt modelId="{63604B8F-716D-4F75-965F-5E6E3A47CC15}" type="pres">
       <dgm:prSet presAssocID="{7926A391-A58F-45F5-8691-C6199265E60E}" presName="connectorText" presStyleLbl="sibTrans2D1" presStyleIdx="4" presStyleCnt="7"/>
       <dgm:spPr/>
+      <dgm:t>
+        <a:bodyPr/>
+        <a:lstStyle/>
+        <a:p>
+          <a:endParaRPr lang="en-US"/>
+        </a:p>
+      </dgm:t>
     </dgm:pt>
     <dgm:pt modelId="{A692716A-65D5-455D-B324-29FC15591B6D}" type="pres">
       <dgm:prSet presAssocID="{DB762877-798D-4BD3-8F71-B21F90D70D4E}" presName="node" presStyleLbl="node1" presStyleIdx="5" presStyleCnt="7">
@@ -2012,14 +2102,35 @@
         </dgm:presLayoutVars>
       </dgm:prSet>
       <dgm:spPr/>
+      <dgm:t>
+        <a:bodyPr/>
+        <a:lstStyle/>
+        <a:p>
+          <a:endParaRPr lang="en-US"/>
+        </a:p>
+      </dgm:t>
     </dgm:pt>
     <dgm:pt modelId="{1C4ED931-40D4-4FA8-BBCE-C7973F6EB752}" type="pres">
       <dgm:prSet presAssocID="{CDE57558-0FE0-4EDF-84E0-68731E4CD46A}" presName="sibTrans" presStyleLbl="sibTrans2D1" presStyleIdx="5" presStyleCnt="7"/>
       <dgm:spPr/>
+      <dgm:t>
+        <a:bodyPr/>
+        <a:lstStyle/>
+        <a:p>
+          <a:endParaRPr lang="en-US"/>
+        </a:p>
+      </dgm:t>
     </dgm:pt>
     <dgm:pt modelId="{6257363B-396A-4B70-BB74-E036F1D4AEDA}" type="pres">
       <dgm:prSet presAssocID="{CDE57558-0FE0-4EDF-84E0-68731E4CD46A}" presName="connectorText" presStyleLbl="sibTrans2D1" presStyleIdx="5" presStyleCnt="7"/>
       <dgm:spPr/>
+      <dgm:t>
+        <a:bodyPr/>
+        <a:lstStyle/>
+        <a:p>
+          <a:endParaRPr lang="en-US"/>
+        </a:p>
+      </dgm:t>
     </dgm:pt>
     <dgm:pt modelId="{FB8DF7EA-E4A6-432C-84B9-18A674F34385}" type="pres">
       <dgm:prSet presAssocID="{17CACC22-6D8C-4C23-A752-BC31E19E9D11}" presName="node" presStyleLbl="node1" presStyleIdx="6" presStyleCnt="7">
@@ -2039,10 +2150,24 @@
     <dgm:pt modelId="{DE3D287E-801B-457C-9EC8-CF9B2C2B3456}" type="pres">
       <dgm:prSet presAssocID="{A788DDD8-0DBF-4A58-AD51-051F309268D3}" presName="sibTrans" presStyleLbl="sibTrans2D1" presStyleIdx="6" presStyleCnt="7"/>
       <dgm:spPr/>
+      <dgm:t>
+        <a:bodyPr/>
+        <a:lstStyle/>
+        <a:p>
+          <a:endParaRPr lang="en-US"/>
+        </a:p>
+      </dgm:t>
     </dgm:pt>
     <dgm:pt modelId="{B780DAE6-3015-43B4-98AD-2D7669CC2B4D}" type="pres">
       <dgm:prSet presAssocID="{A788DDD8-0DBF-4A58-AD51-051F309268D3}" presName="connectorText" presStyleLbl="sibTrans2D1" presStyleIdx="6" presStyleCnt="7"/>
       <dgm:spPr/>
+      <dgm:t>
+        <a:bodyPr/>
+        <a:lstStyle/>
+        <a:p>
+          <a:endParaRPr lang="en-US"/>
+        </a:p>
+      </dgm:t>
     </dgm:pt>
   </dgm:ptLst>
   <dgm:cxnLst>
@@ -2248,6 +2373,13 @@
         </dgm:presLayoutVars>
       </dgm:prSet>
       <dgm:spPr/>
+      <dgm:t>
+        <a:bodyPr/>
+        <a:lstStyle/>
+        <a:p>
+          <a:endParaRPr lang="en-US"/>
+        </a:p>
+      </dgm:t>
     </dgm:pt>
     <dgm:pt modelId="{D87B5B30-B25B-4FBA-8377-8F482D743FA1}" type="pres">
       <dgm:prSet presAssocID="{BB894E50-C491-4ECE-ACF7-859D096EA04A}" presName="node" presStyleLbl="node1" presStyleIdx="0" presStyleCnt="3">
@@ -2267,10 +2399,24 @@
     <dgm:pt modelId="{5DCE53D1-1A57-4641-8784-545AF52A9D1D}" type="pres">
       <dgm:prSet presAssocID="{3CA5F720-DA7F-400F-9480-49219D17B9B4}" presName="sibTrans" presStyleLbl="sibTrans2D1" presStyleIdx="0" presStyleCnt="3"/>
       <dgm:spPr/>
+      <dgm:t>
+        <a:bodyPr/>
+        <a:lstStyle/>
+        <a:p>
+          <a:endParaRPr lang="en-US"/>
+        </a:p>
+      </dgm:t>
     </dgm:pt>
     <dgm:pt modelId="{B58AA11C-2E0C-411C-A7E9-8F19B8A9303F}" type="pres">
       <dgm:prSet presAssocID="{3CA5F720-DA7F-400F-9480-49219D17B9B4}" presName="connectorText" presStyleLbl="sibTrans2D1" presStyleIdx="0" presStyleCnt="3"/>
       <dgm:spPr/>
+      <dgm:t>
+        <a:bodyPr/>
+        <a:lstStyle/>
+        <a:p>
+          <a:endParaRPr lang="en-US"/>
+        </a:p>
+      </dgm:t>
     </dgm:pt>
     <dgm:pt modelId="{4A879D0B-1ECD-44A2-9446-EEBF20E78C7D}" type="pres">
       <dgm:prSet presAssocID="{C751C448-F6CF-4F94-BA96-241A6DC8C57A}" presName="node" presStyleLbl="node1" presStyleIdx="1" presStyleCnt="3">
@@ -2290,10 +2436,24 @@
     <dgm:pt modelId="{28555DF2-8C50-49D9-ADB3-583E5838477A}" type="pres">
       <dgm:prSet presAssocID="{49CB5924-FA9D-4B40-AE9F-F6CF7EA2B05D}" presName="sibTrans" presStyleLbl="sibTrans2D1" presStyleIdx="1" presStyleCnt="3"/>
       <dgm:spPr/>
+      <dgm:t>
+        <a:bodyPr/>
+        <a:lstStyle/>
+        <a:p>
+          <a:endParaRPr lang="en-US"/>
+        </a:p>
+      </dgm:t>
     </dgm:pt>
     <dgm:pt modelId="{B3786751-046D-470B-9454-A5846C978E58}" type="pres">
       <dgm:prSet presAssocID="{49CB5924-FA9D-4B40-AE9F-F6CF7EA2B05D}" presName="connectorText" presStyleLbl="sibTrans2D1" presStyleIdx="1" presStyleCnt="3"/>
       <dgm:spPr/>
+      <dgm:t>
+        <a:bodyPr/>
+        <a:lstStyle/>
+        <a:p>
+          <a:endParaRPr lang="en-US"/>
+        </a:p>
+      </dgm:t>
     </dgm:pt>
     <dgm:pt modelId="{E95CE2CE-6F69-45E4-92A0-FC4532AFFB8D}" type="pres">
       <dgm:prSet presAssocID="{56BF6244-2281-4005-961D-8DE880F530CA}" presName="node" presStyleLbl="node1" presStyleIdx="2" presStyleCnt="3">
@@ -2302,14 +2462,35 @@
         </dgm:presLayoutVars>
       </dgm:prSet>
       <dgm:spPr/>
+      <dgm:t>
+        <a:bodyPr/>
+        <a:lstStyle/>
+        <a:p>
+          <a:endParaRPr lang="en-US"/>
+        </a:p>
+      </dgm:t>
     </dgm:pt>
     <dgm:pt modelId="{5EF851C5-919A-4185-9EA7-954283ADA35C}" type="pres">
       <dgm:prSet presAssocID="{65E54D03-C37D-4265-A7DF-FB2960713236}" presName="sibTrans" presStyleLbl="sibTrans2D1" presStyleIdx="2" presStyleCnt="3"/>
       <dgm:spPr/>
+      <dgm:t>
+        <a:bodyPr/>
+        <a:lstStyle/>
+        <a:p>
+          <a:endParaRPr lang="en-US"/>
+        </a:p>
+      </dgm:t>
     </dgm:pt>
     <dgm:pt modelId="{D93F05A4-3581-465B-9224-436D0A252144}" type="pres">
       <dgm:prSet presAssocID="{65E54D03-C37D-4265-A7DF-FB2960713236}" presName="connectorText" presStyleLbl="sibTrans2D1" presStyleIdx="2" presStyleCnt="3"/>
       <dgm:spPr/>
+      <dgm:t>
+        <a:bodyPr/>
+        <a:lstStyle/>
+        <a:p>
+          <a:endParaRPr lang="en-US"/>
+        </a:p>
+      </dgm:t>
     </dgm:pt>
   </dgm:ptLst>
   <dgm:cxnLst>
@@ -13077,6 +13258,88 @@
 </p:sld>
 </file>
 
+<file path=ppt/slides/slide8.xml><?xml version="1.0" encoding="utf-8"?>
+<p:sld xmlns:a="http://schemas.openxmlformats.org/drawingml/2006/main" xmlns:r="http://schemas.openxmlformats.org/officeDocument/2006/relationships" xmlns:p="http://schemas.openxmlformats.org/presentationml/2006/main">
+  <p:cSld>
+    <p:spTree>
+      <p:nvGrpSpPr>
+        <p:cNvPr id="1" name=""/>
+        <p:cNvGrpSpPr/>
+        <p:nvPr/>
+      </p:nvGrpSpPr>
+      <p:grpSpPr>
+        <a:xfrm>
+          <a:off x="0" y="0"/>
+          <a:ext cx="0" cy="0"/>
+          <a:chOff x="0" y="0"/>
+          <a:chExt cx="0" cy="0"/>
+        </a:xfrm>
+      </p:grpSpPr>
+      <p:sp>
+        <p:nvSpPr>
+          <p:cNvPr id="2" name="Title 1"/>
+          <p:cNvSpPr>
+            <a:spLocks noGrp="1"/>
+          </p:cNvSpPr>
+          <p:nvPr>
+            <p:ph type="title"/>
+          </p:nvPr>
+        </p:nvSpPr>
+        <p:spPr/>
+        <p:txBody>
+          <a:bodyPr/>
+          <a:lstStyle/>
+          <a:p>
+            <a:r>
+              <a:rPr lang="en-US" dirty="0" smtClean="0"/>
+              <a:t>Example Screenshot</a:t>
+            </a:r>
+            <a:endParaRPr lang="en-US" dirty="0"/>
+          </a:p>
+        </p:txBody>
+      </p:sp>
+      <p:pic>
+        <p:nvPicPr>
+          <p:cNvPr id="4" name="Content Placeholder 3"/>
+          <p:cNvPicPr>
+            <a:picLocks noGrp="1" noChangeAspect="1"/>
+          </p:cNvPicPr>
+          <p:nvPr>
+            <p:ph idx="1"/>
+          </p:nvPr>
+        </p:nvPicPr>
+        <p:blipFill>
+          <a:blip r:embed="rId2">
+            <a:extLst>
+              <a:ext uri="{28A0092B-C50C-407E-A947-70E740481C1C}">
+                <a14:useLocalDpi xmlns:a14="http://schemas.microsoft.com/office/drawing/2010/main" val="0"/>
+              </a:ext>
+            </a:extLst>
+          </a:blip>
+          <a:stretch>
+            <a:fillRect/>
+          </a:stretch>
+        </p:blipFill>
+        <p:spPr>
+          <a:xfrm>
+            <a:off x="1384300" y="1867694"/>
+            <a:ext cx="9705975" cy="4267200"/>
+          </a:xfrm>
+        </p:spPr>
+      </p:pic>
+    </p:spTree>
+    <p:extLst>
+      <p:ext uri="{BB962C8B-B14F-4D97-AF65-F5344CB8AC3E}">
+        <p14:creationId xmlns:p14="http://schemas.microsoft.com/office/powerpoint/2010/main" val="4016782777"/>
+      </p:ext>
+    </p:extLst>
+  </p:cSld>
+  <p:clrMapOvr>
+    <a:masterClrMapping/>
+  </p:clrMapOvr>
+</p:sld>
+</file>
+
 <file path=ppt/theme/theme1.xml><?xml version="1.0" encoding="utf-8"?>
 <a:theme xmlns:a="http://schemas.openxmlformats.org/drawingml/2006/main" name="Depth">
   <a:themeElements>

</xml_diff>